<commit_message>
Updated the product module graphic to match the ones in DXCore 9.1.2.
</commit_message>
<xml_diff>
--- a/branches/issue/17/dev/Plugin/CR_DocumentorProductModule.pptx
+++ b/branches/issue/17/dev/Plugin/CR_DocumentorProductModule.pptx
@@ -192,7 +192,8 @@
           <a:p>
             <a:fld id="{093D6AEC-F9CF-4F08-BBFB-7270B0BAB06F}" type="datetimeFigureOut">
               <a:rPr lang="en-US" smtClean="0"/>
-              <a:t>6/3/2008</a:t>
+              <a:pPr/>
+              <a:t>4/14/2009</a:t>
             </a:fld>
             <a:endParaRPr lang="en-US"/>
           </a:p>
@@ -353,6 +354,7 @@
           <a:p>
             <a:fld id="{7A9C0D36-A040-4500-9F05-35F6C37ADE10}" type="slidenum">
               <a:rPr lang="en-US" smtClean="0"/>
+              <a:pPr/>
               <a:t>‹#›</a:t>
             </a:fld>
             <a:endParaRPr lang="en-US"/>
@@ -524,6 +526,7 @@
           <a:p>
             <a:fld id="{7A9C0D36-A040-4500-9F05-35F6C37ADE10}" type="slidenum">
               <a:rPr lang="en-US" smtClean="0"/>
+              <a:pPr/>
               <a:t>1</a:t>
             </a:fld>
             <a:endParaRPr lang="en-US"/>
@@ -719,7 +722,8 @@
           <a:p>
             <a:fld id="{59E16B5D-4C3D-47FD-A673-4085EB0D437E}" type="datetimeFigureOut">
               <a:rPr lang="en-US" smtClean="0"/>
-              <a:t>6/3/2008</a:t>
+              <a:pPr/>
+              <a:t>4/14/2009</a:t>
             </a:fld>
             <a:endParaRPr lang="en-US"/>
           </a:p>
@@ -761,6 +765,7 @@
           <a:p>
             <a:fld id="{57AA7C13-70BD-45C8-9613-940B5FF901DF}" type="slidenum">
               <a:rPr lang="en-US" smtClean="0"/>
+              <a:pPr/>
               <a:t>‹#›</a:t>
             </a:fld>
             <a:endParaRPr lang="en-US"/>
@@ -884,7 +889,8 @@
           <a:p>
             <a:fld id="{59E16B5D-4C3D-47FD-A673-4085EB0D437E}" type="datetimeFigureOut">
               <a:rPr lang="en-US" smtClean="0"/>
-              <a:t>6/3/2008</a:t>
+              <a:pPr/>
+              <a:t>4/14/2009</a:t>
             </a:fld>
             <a:endParaRPr lang="en-US"/>
           </a:p>
@@ -926,6 +932,7 @@
           <a:p>
             <a:fld id="{57AA7C13-70BD-45C8-9613-940B5FF901DF}" type="slidenum">
               <a:rPr lang="en-US" smtClean="0"/>
+              <a:pPr/>
               <a:t>‹#›</a:t>
             </a:fld>
             <a:endParaRPr lang="en-US"/>
@@ -1059,7 +1066,8 @@
           <a:p>
             <a:fld id="{59E16B5D-4C3D-47FD-A673-4085EB0D437E}" type="datetimeFigureOut">
               <a:rPr lang="en-US" smtClean="0"/>
-              <a:t>6/3/2008</a:t>
+              <a:pPr/>
+              <a:t>4/14/2009</a:t>
             </a:fld>
             <a:endParaRPr lang="en-US"/>
           </a:p>
@@ -1101,6 +1109,7 @@
           <a:p>
             <a:fld id="{57AA7C13-70BD-45C8-9613-940B5FF901DF}" type="slidenum">
               <a:rPr lang="en-US" smtClean="0"/>
+              <a:pPr/>
               <a:t>‹#›</a:t>
             </a:fld>
             <a:endParaRPr lang="en-US"/>
@@ -1224,7 +1233,8 @@
           <a:p>
             <a:fld id="{59E16B5D-4C3D-47FD-A673-4085EB0D437E}" type="datetimeFigureOut">
               <a:rPr lang="en-US" smtClean="0"/>
-              <a:t>6/3/2008</a:t>
+              <a:pPr/>
+              <a:t>4/14/2009</a:t>
             </a:fld>
             <a:endParaRPr lang="en-US"/>
           </a:p>
@@ -1266,6 +1276,7 @@
           <a:p>
             <a:fld id="{57AA7C13-70BD-45C8-9613-940B5FF901DF}" type="slidenum">
               <a:rPr lang="en-US" smtClean="0"/>
+              <a:pPr/>
               <a:t>‹#›</a:t>
             </a:fld>
             <a:endParaRPr lang="en-US"/>
@@ -1465,7 +1476,8 @@
           <a:p>
             <a:fld id="{59E16B5D-4C3D-47FD-A673-4085EB0D437E}" type="datetimeFigureOut">
               <a:rPr lang="en-US" smtClean="0"/>
-              <a:t>6/3/2008</a:t>
+              <a:pPr/>
+              <a:t>4/14/2009</a:t>
             </a:fld>
             <a:endParaRPr lang="en-US"/>
           </a:p>
@@ -1507,6 +1519,7 @@
           <a:p>
             <a:fld id="{57AA7C13-70BD-45C8-9613-940B5FF901DF}" type="slidenum">
               <a:rPr lang="en-US" smtClean="0"/>
+              <a:pPr/>
               <a:t>‹#›</a:t>
             </a:fld>
             <a:endParaRPr lang="en-US"/>
@@ -1748,7 +1761,8 @@
           <a:p>
             <a:fld id="{59E16B5D-4C3D-47FD-A673-4085EB0D437E}" type="datetimeFigureOut">
               <a:rPr lang="en-US" smtClean="0"/>
-              <a:t>6/3/2008</a:t>
+              <a:pPr/>
+              <a:t>4/14/2009</a:t>
             </a:fld>
             <a:endParaRPr lang="en-US"/>
           </a:p>
@@ -1790,6 +1804,7 @@
           <a:p>
             <a:fld id="{57AA7C13-70BD-45C8-9613-940B5FF901DF}" type="slidenum">
               <a:rPr lang="en-US" smtClean="0"/>
+              <a:pPr/>
               <a:t>‹#›</a:t>
             </a:fld>
             <a:endParaRPr lang="en-US"/>
@@ -2165,7 +2180,8 @@
           <a:p>
             <a:fld id="{59E16B5D-4C3D-47FD-A673-4085EB0D437E}" type="datetimeFigureOut">
               <a:rPr lang="en-US" smtClean="0"/>
-              <a:t>6/3/2008</a:t>
+              <a:pPr/>
+              <a:t>4/14/2009</a:t>
             </a:fld>
             <a:endParaRPr lang="en-US"/>
           </a:p>
@@ -2207,6 +2223,7 @@
           <a:p>
             <a:fld id="{57AA7C13-70BD-45C8-9613-940B5FF901DF}" type="slidenum">
               <a:rPr lang="en-US" smtClean="0"/>
+              <a:pPr/>
               <a:t>‹#›</a:t>
             </a:fld>
             <a:endParaRPr lang="en-US"/>
@@ -2278,7 +2295,8 @@
           <a:p>
             <a:fld id="{59E16B5D-4C3D-47FD-A673-4085EB0D437E}" type="datetimeFigureOut">
               <a:rPr lang="en-US" smtClean="0"/>
-              <a:t>6/3/2008</a:t>
+              <a:pPr/>
+              <a:t>4/14/2009</a:t>
             </a:fld>
             <a:endParaRPr lang="en-US"/>
           </a:p>
@@ -2320,6 +2338,7 @@
           <a:p>
             <a:fld id="{57AA7C13-70BD-45C8-9613-940B5FF901DF}" type="slidenum">
               <a:rPr lang="en-US" smtClean="0"/>
+              <a:pPr/>
               <a:t>‹#›</a:t>
             </a:fld>
             <a:endParaRPr lang="en-US"/>
@@ -2368,7 +2387,8 @@
           <a:p>
             <a:fld id="{59E16B5D-4C3D-47FD-A673-4085EB0D437E}" type="datetimeFigureOut">
               <a:rPr lang="en-US" smtClean="0"/>
-              <a:t>6/3/2008</a:t>
+              <a:pPr/>
+              <a:t>4/14/2009</a:t>
             </a:fld>
             <a:endParaRPr lang="en-US"/>
           </a:p>
@@ -2410,6 +2430,7 @@
           <a:p>
             <a:fld id="{57AA7C13-70BD-45C8-9613-940B5FF901DF}" type="slidenum">
               <a:rPr lang="en-US" smtClean="0"/>
+              <a:pPr/>
               <a:t>‹#›</a:t>
             </a:fld>
             <a:endParaRPr lang="en-US"/>
@@ -2640,7 +2661,8 @@
           <a:p>
             <a:fld id="{59E16B5D-4C3D-47FD-A673-4085EB0D437E}" type="datetimeFigureOut">
               <a:rPr lang="en-US" smtClean="0"/>
-              <a:t>6/3/2008</a:t>
+              <a:pPr/>
+              <a:t>4/14/2009</a:t>
             </a:fld>
             <a:endParaRPr lang="en-US"/>
           </a:p>
@@ -2682,6 +2704,7 @@
           <a:p>
             <a:fld id="{57AA7C13-70BD-45C8-9613-940B5FF901DF}" type="slidenum">
               <a:rPr lang="en-US" smtClean="0"/>
+              <a:pPr/>
               <a:t>‹#›</a:t>
             </a:fld>
             <a:endParaRPr lang="en-US"/>
@@ -2888,7 +2911,8 @@
           <a:p>
             <a:fld id="{59E16B5D-4C3D-47FD-A673-4085EB0D437E}" type="datetimeFigureOut">
               <a:rPr lang="en-US" smtClean="0"/>
-              <a:t>6/3/2008</a:t>
+              <a:pPr/>
+              <a:t>4/14/2009</a:t>
             </a:fld>
             <a:endParaRPr lang="en-US"/>
           </a:p>
@@ -2930,6 +2954,7 @@
           <a:p>
             <a:fld id="{57AA7C13-70BD-45C8-9613-940B5FF901DF}" type="slidenum">
               <a:rPr lang="en-US" smtClean="0"/>
+              <a:pPr/>
               <a:t>‹#›</a:t>
             </a:fld>
             <a:endParaRPr lang="en-US"/>
@@ -3099,7 +3124,8 @@
           <a:p>
             <a:fld id="{59E16B5D-4C3D-47FD-A673-4085EB0D437E}" type="datetimeFigureOut">
               <a:rPr lang="en-US" smtClean="0"/>
-              <a:t>6/3/2008</a:t>
+              <a:pPr/>
+              <a:t>4/14/2009</a:t>
             </a:fld>
             <a:endParaRPr lang="en-US"/>
           </a:p>
@@ -3177,6 +3203,7 @@
           <a:p>
             <a:fld id="{57AA7C13-70BD-45C8-9613-940B5FF901DF}" type="slidenum">
               <a:rPr lang="en-US" smtClean="0"/>
+              <a:pPr/>
               <a:t>‹#›</a:t>
             </a:fld>
             <a:endParaRPr lang="en-US"/>
@@ -3482,6 +3509,7 @@
             <a:chOff x="5181600" y="685800"/>
             <a:chExt cx="2209800" cy="3196238"/>
           </a:xfrm>
+          <a:effectLst/>
         </p:grpSpPr>
         <p:grpSp>
           <p:nvGrpSpPr>
@@ -3539,11 +3567,7 @@
                     </a:schemeClr>
                   </a:solidFill>
                 </a:ln>
-                <a:effectLst>
-                  <a:outerShdw blurRad="127000" dir="2700000" sx="105000" sy="105000" algn="tl" rotWithShape="0">
-                    <a:prstClr val="black"/>
-                  </a:outerShdw>
-                </a:effectLst>
+                <a:effectLst/>
               </p:spPr>
               <p:style>
                 <a:lnRef idx="2">
@@ -3942,59 +3966,38 @@
       </p:grpSp>
       <p:grpSp>
         <p:nvGrpSpPr>
-          <p:cNvPr id="21" name="Group 20"/>
+          <p:cNvPr id="23" name="Group 22"/>
           <p:cNvGrpSpPr/>
           <p:nvPr/>
         </p:nvGrpSpPr>
         <p:grpSpPr>
           <a:xfrm>
-            <a:off x="3962400" y="2286000"/>
-            <a:ext cx="2514600" cy="3170099"/>
-            <a:chOff x="990600" y="2743200"/>
-            <a:chExt cx="2514600" cy="3170099"/>
+            <a:off x="3761232" y="2286000"/>
+            <a:ext cx="2944368" cy="3170099"/>
+            <a:chOff x="3761232" y="2286000"/>
+            <a:chExt cx="2944368" cy="3170099"/>
           </a:xfrm>
         </p:grpSpPr>
         <p:sp>
           <p:nvSpPr>
-            <p:cNvPr id="19" name="Oval 18"/>
+            <p:cNvPr id="22" name="Oval 21"/>
             <p:cNvSpPr/>
             <p:nvPr/>
           </p:nvSpPr>
           <p:spPr>
             <a:xfrm>
-              <a:off x="990600" y="2971800"/>
-              <a:ext cx="2514600" cy="2514600"/>
+              <a:off x="3761232" y="2304288"/>
+              <a:ext cx="2944368" cy="2944368"/>
             </a:xfrm>
             <a:prstGeom prst="ellipse">
               <a:avLst/>
             </a:prstGeom>
-            <a:gradFill flip="none" rotWithShape="1">
-              <a:gsLst>
-                <a:gs pos="0">
-                  <a:srgbClr val="2759BD"/>
-                </a:gs>
-                <a:gs pos="54000">
-                  <a:srgbClr val="487CE3"/>
-                </a:gs>
-                <a:gs pos="100000">
-                  <a:srgbClr val="A6DDFF"/>
-                </a:gs>
-              </a:gsLst>
-              <a:lin ang="13500000" scaled="1"/>
-              <a:tileRect/>
-            </a:gradFill>
-            <a:ln w="314325">
-              <a:solidFill>
-                <a:schemeClr val="tx1">
-                  <a:lumMod val="95000"/>
-                </a:schemeClr>
-              </a:solidFill>
+            <a:solidFill>
+              <a:schemeClr val="bg1"/>
+            </a:solidFill>
+            <a:ln>
+              <a:noFill/>
             </a:ln>
-            <a:effectLst>
-              <a:outerShdw blurRad="127000" dir="2700000" sx="105000" sy="105000" algn="tl" rotWithShape="0">
-                <a:prstClr val="black"/>
-              </a:outerShdw>
-            </a:effectLst>
           </p:spPr>
           <p:style>
             <a:lnRef idx="2">
@@ -4021,43 +4024,135 @@
             </a:p>
           </p:txBody>
         </p:sp>
-        <p:sp>
-          <p:nvSpPr>
-            <p:cNvPr id="20" name="Rectangle 19"/>
-            <p:cNvSpPr/>
+        <p:grpSp>
+          <p:nvGrpSpPr>
+            <p:cNvPr id="21" name="Group 20"/>
+            <p:cNvGrpSpPr/>
             <p:nvPr/>
-          </p:nvSpPr>
-          <p:spPr>
+          </p:nvGrpSpPr>
+          <p:grpSpPr>
             <a:xfrm>
-              <a:off x="1600200" y="2743200"/>
-              <a:ext cx="1391728" cy="3170099"/>
+              <a:off x="3976116" y="2286000"/>
+              <a:ext cx="2514600" cy="3170099"/>
+              <a:chOff x="990600" y="2743200"/>
+              <a:chExt cx="2514600" cy="3170099"/>
             </a:xfrm>
-            <a:prstGeom prst="rect">
-              <a:avLst/>
-            </a:prstGeom>
-            <a:noFill/>
-          </p:spPr>
-          <p:txBody>
-            <a:bodyPr wrap="none" lIns="91440" tIns="45720" rIns="91440" bIns="45720">
-              <a:spAutoFit/>
-              <a:scene3d>
-                <a:camera prst="orthographicFront"/>
-                <a:lightRig rig="soft" dir="t">
-                  <a:rot lat="0" lon="0" rev="10800000"/>
-                </a:lightRig>
-              </a:scene3d>
-              <a:sp3d>
-                <a:bevelT w="27940" h="12700"/>
-                <a:contourClr>
-                  <a:srgbClr val="DDDDDD"/>
-                </a:contourClr>
-              </a:sp3d>
-            </a:bodyPr>
-            <a:lstStyle/>
-            <a:p>
-              <a:pPr algn="ctr"/>
-              <a:r>
-                <a:rPr lang="en-US" sz="20000" b="1" cap="none" spc="150" dirty="0" smtClean="0">
+          </p:grpSpPr>
+          <p:sp>
+            <p:nvSpPr>
+              <p:cNvPr id="19" name="Oval 18"/>
+              <p:cNvSpPr/>
+              <p:nvPr/>
+            </p:nvSpPr>
+            <p:spPr>
+              <a:xfrm>
+                <a:off x="990600" y="2971800"/>
+                <a:ext cx="2514600" cy="2514600"/>
+              </a:xfrm>
+              <a:prstGeom prst="ellipse">
+                <a:avLst/>
+              </a:prstGeom>
+              <a:gradFill flip="none" rotWithShape="1">
+                <a:gsLst>
+                  <a:gs pos="0">
+                    <a:srgbClr val="2759BD"/>
+                  </a:gs>
+                  <a:gs pos="54000">
+                    <a:srgbClr val="487CE3"/>
+                  </a:gs>
+                  <a:gs pos="100000">
+                    <a:srgbClr val="A6DDFF"/>
+                  </a:gs>
+                </a:gsLst>
+                <a:lin ang="13500000" scaled="1"/>
+                <a:tileRect/>
+              </a:gradFill>
+              <a:ln w="314325">
+                <a:solidFill>
+                  <a:schemeClr val="tx1">
+                    <a:lumMod val="95000"/>
+                  </a:schemeClr>
+                </a:solidFill>
+              </a:ln>
+              <a:effectLst/>
+            </p:spPr>
+            <p:style>
+              <a:lnRef idx="2">
+                <a:schemeClr val="accent1">
+                  <a:shade val="50000"/>
+                </a:schemeClr>
+              </a:lnRef>
+              <a:fillRef idx="1">
+                <a:schemeClr val="accent1"/>
+              </a:fillRef>
+              <a:effectRef idx="0">
+                <a:schemeClr val="accent1"/>
+              </a:effectRef>
+              <a:fontRef idx="minor">
+                <a:schemeClr val="lt1"/>
+              </a:fontRef>
+            </p:style>
+            <p:txBody>
+              <a:bodyPr rtlCol="0" anchor="ctr"/>
+              <a:lstStyle/>
+              <a:p>
+                <a:pPr algn="ctr"/>
+                <a:endParaRPr lang="en-US"/>
+              </a:p>
+            </p:txBody>
+          </p:sp>
+          <p:sp>
+            <p:nvSpPr>
+              <p:cNvPr id="20" name="Rectangle 19"/>
+              <p:cNvSpPr/>
+              <p:nvPr/>
+            </p:nvSpPr>
+            <p:spPr>
+              <a:xfrm>
+                <a:off x="1600200" y="2743200"/>
+                <a:ext cx="1391728" cy="3170099"/>
+              </a:xfrm>
+              <a:prstGeom prst="rect">
+                <a:avLst/>
+              </a:prstGeom>
+              <a:noFill/>
+            </p:spPr>
+            <p:txBody>
+              <a:bodyPr wrap="none" lIns="91440" tIns="45720" rIns="91440" bIns="45720">
+                <a:spAutoFit/>
+                <a:scene3d>
+                  <a:camera prst="orthographicFront"/>
+                  <a:lightRig rig="soft" dir="t">
+                    <a:rot lat="0" lon="0" rev="10800000"/>
+                  </a:lightRig>
+                </a:scene3d>
+                <a:sp3d>
+                  <a:bevelT w="27940" h="12700"/>
+                  <a:contourClr>
+                    <a:srgbClr val="DDDDDD"/>
+                  </a:contourClr>
+                </a:sp3d>
+              </a:bodyPr>
+              <a:lstStyle/>
+              <a:p>
+                <a:pPr algn="ctr"/>
+                <a:r>
+                  <a:rPr lang="en-US" sz="20000" b="1" cap="none" spc="150" dirty="0" smtClean="0">
+                    <a:ln w="11430"/>
+                    <a:solidFill>
+                      <a:srgbClr val="F8F8F8"/>
+                    </a:solidFill>
+                    <a:effectLst>
+                      <a:outerShdw blurRad="25400" algn="tl" rotWithShape="0">
+                        <a:srgbClr val="000000">
+                          <a:alpha val="43000"/>
+                        </a:srgbClr>
+                      </a:outerShdw>
+                    </a:effectLst>
+                  </a:rPr>
+                  <a:t>?</a:t>
+                </a:r>
+                <a:endParaRPr lang="en-US" sz="20000" b="1" cap="none" spc="150" dirty="0">
                   <a:ln w="11430"/>
                   <a:solidFill>
                     <a:srgbClr val="F8F8F8"/>
@@ -4069,25 +4164,11 @@
                       </a:srgbClr>
                     </a:outerShdw>
                   </a:effectLst>
-                </a:rPr>
-                <a:t>?</a:t>
-              </a:r>
-              <a:endParaRPr lang="en-US" sz="20000" b="1" cap="none" spc="150" dirty="0">
-                <a:ln w="11430"/>
-                <a:solidFill>
-                  <a:srgbClr val="F8F8F8"/>
-                </a:solidFill>
-                <a:effectLst>
-                  <a:outerShdw blurRad="25400" algn="tl" rotWithShape="0">
-                    <a:srgbClr val="000000">
-                      <a:alpha val="43000"/>
-                    </a:srgbClr>
-                  </a:outerShdw>
-                </a:effectLst>
-              </a:endParaRPr>
-            </a:p>
-          </p:txBody>
-        </p:sp>
+                </a:endParaRPr>
+              </a:p>
+            </p:txBody>
+          </p:sp>
+        </p:grpSp>
       </p:grpSp>
     </p:spTree>
   </p:cSld>

</xml_diff>